<commit_message>
Added BCS with notes
</commit_message>
<xml_diff>
--- a/202301 - BCS/DevSecOps - DevSecOps More than just Shift-left Security.pptx
+++ b/202301 - BCS/DevSecOps - DevSecOps More than just Shift-left Security.pptx
@@ -729,7 +729,7 @@
           <a:p>
             <a:fld id="{4340E002-B88B-4BB0-BA5A-919501F4FBF2}" type="datetimeFigureOut">
               <a:rPr lang="en-GB" smtClean="0"/>
-              <a:t>25/01/2023</a:t>
+              <a:t>26/01/2023</a:t>
             </a:fld>
             <a:endParaRPr lang="en-GB"/>
           </a:p>
@@ -1041,7 +1041,27 @@
           <a:bodyPr/>
           <a:lstStyle/>
           <a:p>
+            <a:r>
+              <a:rPr lang="en-GB" dirty="0" err="1" smtClean="0"/>
+              <a:t>DevSecOps</a:t>
+            </a:r>
+            <a:r>
+              <a:rPr lang="en-GB" dirty="0" smtClean="0"/>
+              <a:t>: More than just Shift-left Security</a:t>
+            </a:r>
+          </a:p>
+          <a:p>
             <a:pPr algn="l"/>
+            <a:r>
+              <a:rPr lang="en-GB" b="0" i="0" dirty="0" smtClean="0">
+                <a:solidFill>
+                  <a:srgbClr val="000000"/>
+                </a:solidFill>
+                <a:effectLst/>
+                <a:latin typeface="-apple-system"/>
+              </a:rPr>
+              <a:t>Vulnerabilities </a:t>
+            </a:r>
             <a:r>
               <a:rPr lang="en-GB" b="0" i="0" dirty="0">
                 <a:solidFill>
@@ -1050,20 +1070,7 @@
                 <a:effectLst/>
                 <a:latin typeface="-apple-system"/>
               </a:rPr>
-              <a:t>Shift-left Security: More than just a catchphrase</a:t>
-            </a:r>
-          </a:p>
-          <a:p>
-            <a:pPr algn="l"/>
-            <a:r>
-              <a:rPr lang="en-GB" b="0" i="0" dirty="0">
-                <a:solidFill>
-                  <a:srgbClr val="000000"/>
-                </a:solidFill>
-                <a:effectLst/>
-                <a:latin typeface="-apple-system"/>
-              </a:rPr>
-              <a:t>Vulnerabilities like Log4j may be headline grabbers, but thousands of applications are being targeted by hackers who use flaws in code as attack vectors.  Vulnerabilities such as cross-site scripting or improper authorisation are on the increase, and with the increased use of open source software we need to ensure "shift-left security" is more than just a catchphrase.</a:t>
+              <a:t>like Log4j may be headline grabbers, but thousands of applications are being targeted by hackers who use flaws in code as attack vectors.  Vulnerabilities such as cross-site scripting or improper authorisation are on the increase, and with the increased use of open source software we need to ensure "shift-left security" is more than just a catchphrase.</a:t>
             </a:r>
           </a:p>
           <a:p>
@@ -1102,8 +1109,35 @@
                 <a:effectLst/>
                 <a:latin typeface="-apple-system"/>
               </a:rPr>
-              <a:t>- what modern development looks like</a:t>
-            </a:r>
+              <a:t>- what </a:t>
+            </a:r>
+            <a:r>
+              <a:rPr lang="en-GB" b="0" i="0" dirty="0" smtClean="0">
+                <a:solidFill>
+                  <a:srgbClr val="000000"/>
+                </a:solidFill>
+                <a:effectLst/>
+                <a:latin typeface="-apple-system"/>
+              </a:rPr>
+              <a:t>DevOps</a:t>
+            </a:r>
+            <a:r>
+              <a:rPr lang="en-GB" b="0" i="0" baseline="0" dirty="0" smtClean="0">
+                <a:solidFill>
+                  <a:srgbClr val="000000"/>
+                </a:solidFill>
+                <a:effectLst/>
+                <a:latin typeface="-apple-system"/>
+              </a:rPr>
+              <a:t> should be and how it perceives Security</a:t>
+            </a:r>
+            <a:endParaRPr lang="en-GB" b="0" i="0" dirty="0">
+              <a:solidFill>
+                <a:srgbClr val="000000"/>
+              </a:solidFill>
+              <a:effectLst/>
+              <a:latin typeface="-apple-system"/>
+            </a:endParaRPr>
           </a:p>
           <a:p>
             <a:pPr algn="l"/>
@@ -1519,21 +1553,84 @@
           <a:lstStyle/>
           <a:p>
             <a:r>
+              <a:rPr lang="en-GB" dirty="0" smtClean="0"/>
+              <a:t>Favourite </a:t>
+            </a:r>
+            <a:r>
               <a:rPr lang="en-GB" dirty="0"/>
-              <a:t>One of my favourite concepts when talking about cloud is the ability to destroy and rebuild resources</a:t>
+              <a:t>concepts </a:t>
+            </a:r>
+            <a:endParaRPr lang="en-GB" dirty="0" smtClean="0"/>
+          </a:p>
+          <a:p>
+            <a:r>
+              <a:rPr lang="en-GB" dirty="0" smtClean="0"/>
+              <a:t>destroy </a:t>
+            </a:r>
+            <a:r>
+              <a:rPr lang="en-GB" dirty="0"/>
+              <a:t>and rebuild </a:t>
+            </a:r>
+            <a:r>
+              <a:rPr lang="en-GB" baseline="0" dirty="0" smtClean="0"/>
+              <a:t>pets </a:t>
             </a:r>
             <a:r>
               <a:rPr lang="en-GB" baseline="0" dirty="0"/>
-              <a:t> and the idea of pets versus cattle.  I remember the last time I asked for a new, on premise, server.  After much form-filling, interrogation, and small brown envelopes in the hands of the right people, I finally got my server.  It was like a pet.  When it was ill I’d care for it by updating and patching software.  I’d feed it with new applications and libraries.  And, I’d never let it be turned off.  But in the cloud we have to think very differently.  Our resources shouldn’t be treated as pets; they should be seen as cattle.  When a head of cattle is ill, it is disposed of, and replaced.  This should be the same with our cloud assets.</a:t>
-            </a:r>
+              <a:t>versus </a:t>
+            </a:r>
+            <a:r>
+              <a:rPr lang="en-GB" baseline="0" dirty="0" smtClean="0"/>
+              <a:t>cattle</a:t>
+            </a:r>
+          </a:p>
+          <a:p>
+            <a:r>
+              <a:rPr lang="en-GB" baseline="0" dirty="0" smtClean="0"/>
+              <a:t>Remember on </a:t>
+            </a:r>
+            <a:r>
+              <a:rPr lang="en-GB" baseline="0" dirty="0"/>
+              <a:t>premise, </a:t>
+            </a:r>
+            <a:r>
+              <a:rPr lang="en-GB" baseline="0" dirty="0" smtClean="0"/>
+              <a:t>server</a:t>
+            </a:r>
+          </a:p>
+          <a:p>
+            <a:r>
+              <a:rPr lang="en-GB" baseline="0" dirty="0" smtClean="0"/>
+              <a:t>never </a:t>
+            </a:r>
+            <a:r>
+              <a:rPr lang="en-GB" baseline="0" dirty="0"/>
+              <a:t>let it be turned off.  </a:t>
+            </a:r>
+            <a:endParaRPr lang="en-GB" baseline="0" dirty="0" smtClean="0"/>
           </a:p>
           <a:p>
             <a:endParaRPr lang="en-GB" baseline="0" dirty="0"/>
           </a:p>
           <a:p>
             <a:r>
+              <a:rPr lang="en-GB" baseline="0" dirty="0" smtClean="0"/>
+              <a:t>Recreate </a:t>
+            </a:r>
+            <a:r>
               <a:rPr lang="en-GB" baseline="0" dirty="0"/>
-              <a:t>Embracing this concepts helps us in a number of ways.  Setting up processes to destroy and recreate assets with the latest versions of software keeps us on top of any newly released vulnerabilities.  If we regularly rejuvenate our assets every 7 days, we limit the potential persistence of any issues.  A hacker can spend weeks trying to infiltrate a system and systems that get refreshed regularly are going to a more difficult target.</a:t>
+              <a:t>assets with the latest versions of software keeps us on top of any newly released vulnerabilities.  </a:t>
+            </a:r>
+            <a:endParaRPr lang="en-GB" baseline="0" dirty="0" smtClean="0"/>
+          </a:p>
+          <a:p>
+            <a:r>
+              <a:rPr lang="en-GB" baseline="0" dirty="0" smtClean="0"/>
+              <a:t>Limit </a:t>
+            </a:r>
+            <a:r>
+              <a:rPr lang="en-GB" baseline="0" dirty="0"/>
+              <a:t>the potential persistence of any issues.  A hacker can spend weeks trying to infiltrate a system and systems that get refreshed regularly are going to a more difficult target.</a:t>
             </a:r>
           </a:p>
           <a:p>
@@ -2126,9 +2223,17 @@
               </a:rPr>
               <a:t>Hot on the heels of Okta's source code breach, in December we had Slack experiencing a threat actor accessing their repositories using stolen (valid) tokens.</a:t>
             </a:r>
+            <a:r>
+              <a:rPr lang="en-GB" dirty="0"/>
+              <a:t/>
+            </a:r>
             <a:br>
               <a:rPr lang="en-GB" dirty="0"/>
             </a:br>
+            <a:r>
+              <a:rPr lang="en-GB" dirty="0"/>
+              <a:t/>
+            </a:r>
             <a:br>
               <a:rPr lang="en-GB" dirty="0"/>
             </a:br>
@@ -2139,9 +2244,17 @@
               </a:rPr>
               <a:t>Access tokens are an invaluable capability of working with remote services, including GitHub, but as always WE have to be careful as they can expose great power.</a:t>
             </a:r>
+            <a:r>
+              <a:rPr lang="en-GB" dirty="0"/>
+              <a:t/>
+            </a:r>
             <a:br>
               <a:rPr lang="en-GB" dirty="0"/>
             </a:br>
+            <a:r>
+              <a:rPr lang="en-GB" dirty="0"/>
+              <a:t/>
+            </a:r>
             <a:br>
               <a:rPr lang="en-GB" dirty="0"/>
             </a:br>
@@ -2152,6 +2265,10 @@
               </a:rPr>
               <a:t>Simple GitHub access token advice:</a:t>
             </a:r>
+            <a:r>
+              <a:rPr lang="en-GB" dirty="0"/>
+              <a:t/>
+            </a:r>
             <a:br>
               <a:rPr lang="en-GB" dirty="0"/>
             </a:br>
@@ -2162,6 +2279,10 @@
               </a:rPr>
               <a:t>- store tokens securely (always the first bit of advice in this type of post... don't write them down!)</a:t>
             </a:r>
+            <a:r>
+              <a:rPr lang="en-GB" dirty="0"/>
+              <a:t/>
+            </a:r>
             <a:br>
               <a:rPr lang="en-GB" dirty="0"/>
             </a:br>
@@ -2172,6 +2293,10 @@
               </a:rPr>
               <a:t>- use fine grained access tokens to enforce the principal of least privilege</a:t>
             </a:r>
+            <a:r>
+              <a:rPr lang="en-GB" dirty="0"/>
+              <a:t/>
+            </a:r>
             <a:br>
               <a:rPr lang="en-GB" dirty="0"/>
             </a:br>
@@ -2182,6 +2307,10 @@
               </a:rPr>
               <a:t>- create and enforce an expiration policy; the longer they exist, the more damage can be done</a:t>
             </a:r>
+            <a:r>
+              <a:rPr lang="en-GB" dirty="0"/>
+              <a:t/>
+            </a:r>
             <a:br>
               <a:rPr lang="en-GB" dirty="0"/>
             </a:br>
@@ -2191,6 +2320,10 @@
                 <a:latin typeface="-apple-system"/>
               </a:rPr>
               <a:t>- tokens don't just give access to code, they can allow access to Actions, so check their capabilities</a:t>
+            </a:r>
+            <a:r>
+              <a:rPr lang="en-GB" dirty="0"/>
+              <a:t/>
             </a:r>
             <a:br>
               <a:rPr lang="en-GB" dirty="0"/>
@@ -2293,9 +2426,17 @@
               </a:rPr>
               <a:t>Hot on the heels of Okta's source code breach, in December we had Slack experiencing a threat actor accessing their repositories using stolen (valid) tokens.</a:t>
             </a:r>
+            <a:r>
+              <a:rPr lang="en-GB" dirty="0"/>
+              <a:t/>
+            </a:r>
             <a:br>
               <a:rPr lang="en-GB" dirty="0"/>
             </a:br>
+            <a:r>
+              <a:rPr lang="en-GB" dirty="0"/>
+              <a:t/>
+            </a:r>
             <a:br>
               <a:rPr lang="en-GB" dirty="0"/>
             </a:br>
@@ -2306,9 +2447,17 @@
               </a:rPr>
               <a:t>Access tokens are an invaluable capability of working with remote services, including GitHub, but as always WE have to be careful as they can expose great power.</a:t>
             </a:r>
+            <a:r>
+              <a:rPr lang="en-GB" dirty="0"/>
+              <a:t/>
+            </a:r>
             <a:br>
               <a:rPr lang="en-GB" dirty="0"/>
             </a:br>
+            <a:r>
+              <a:rPr lang="en-GB" dirty="0"/>
+              <a:t/>
+            </a:r>
             <a:br>
               <a:rPr lang="en-GB" dirty="0"/>
             </a:br>
@@ -2319,6 +2468,10 @@
               </a:rPr>
               <a:t>Simple GitHub access token advice:</a:t>
             </a:r>
+            <a:r>
+              <a:rPr lang="en-GB" dirty="0"/>
+              <a:t/>
+            </a:r>
             <a:br>
               <a:rPr lang="en-GB" dirty="0"/>
             </a:br>
@@ -2329,6 +2482,10 @@
               </a:rPr>
               <a:t>- store tokens securely (always the first bit of advice in this type of post... don't write them down!)</a:t>
             </a:r>
+            <a:r>
+              <a:rPr lang="en-GB" dirty="0"/>
+              <a:t/>
+            </a:r>
             <a:br>
               <a:rPr lang="en-GB" dirty="0"/>
             </a:br>
@@ -2339,6 +2496,10 @@
               </a:rPr>
               <a:t>- use fine grained access tokens to enforce the principal of least privilege</a:t>
             </a:r>
+            <a:r>
+              <a:rPr lang="en-GB" dirty="0"/>
+              <a:t/>
+            </a:r>
             <a:br>
               <a:rPr lang="en-GB" dirty="0"/>
             </a:br>
@@ -2349,6 +2510,10 @@
               </a:rPr>
               <a:t>- create and enforce an expiration policy; the longer they exist, the more damage can be done</a:t>
             </a:r>
+            <a:r>
+              <a:rPr lang="en-GB" dirty="0"/>
+              <a:t/>
+            </a:r>
             <a:br>
               <a:rPr lang="en-GB" dirty="0"/>
             </a:br>
@@ -2358,6 +2523,10 @@
                 <a:latin typeface="-apple-system"/>
               </a:rPr>
               <a:t>- tokens don't just give access to code, they can allow access to Actions, so check their capabilities</a:t>
+            </a:r>
+            <a:r>
+              <a:rPr lang="en-GB" dirty="0"/>
+              <a:t/>
             </a:r>
             <a:br>
               <a:rPr lang="en-GB" dirty="0"/>
@@ -2514,12 +2683,41 @@
           <a:lstStyle/>
           <a:p>
             <a:r>
-              <a:rPr lang="en-GB" dirty="0"/>
-              <a:t>My </a:t>
+              <a:rPr lang="en-GB" baseline="0" dirty="0" smtClean="0"/>
+              <a:t>10 years</a:t>
+            </a:r>
+          </a:p>
+          <a:p>
+            <a:r>
+              <a:rPr lang="en-GB" baseline="0" dirty="0" smtClean="0"/>
+              <a:t>reformed developer / Ops </a:t>
             </a:r>
             <a:r>
               <a:rPr lang="en-GB" baseline="0" dirty="0"/>
-              <a:t>name is Vince King, and I’ve been at the Bank of England for almost 10 years.  I’m a reformed developer, and have numerous roles including Ops Lead and DevOps subject matter expert having created the DevOps capability within the Bank.  I moved to Cyber 4 years ago working on Vulnerability Management and have been picking up as much experience (and as many certifications) as I can.</a:t>
+              <a:t>Lead </a:t>
+            </a:r>
+            <a:r>
+              <a:rPr lang="en-GB" baseline="0" dirty="0" smtClean="0"/>
+              <a:t>/ DevOps </a:t>
+            </a:r>
+            <a:r>
+              <a:rPr lang="en-GB" baseline="0" dirty="0"/>
+              <a:t>subject matter expert </a:t>
+            </a:r>
+            <a:endParaRPr lang="en-GB" baseline="0" dirty="0" smtClean="0"/>
+          </a:p>
+          <a:p>
+            <a:r>
+              <a:rPr lang="en-GB" baseline="0" dirty="0" smtClean="0"/>
+              <a:t>Cyber </a:t>
+            </a:r>
+            <a:r>
+              <a:rPr lang="en-GB" baseline="0" dirty="0"/>
+              <a:t>4 years ago working on Vulnerability </a:t>
+            </a:r>
+            <a:r>
+              <a:rPr lang="en-GB" baseline="0" dirty="0" smtClean="0"/>
+              <a:t>Management</a:t>
             </a:r>
           </a:p>
           <a:p>
@@ -2527,8 +2725,12 @@
           </a:p>
           <a:p>
             <a:r>
+              <a:rPr lang="en-GB" baseline="0" dirty="0" smtClean="0"/>
+              <a:t>Now </a:t>
+            </a:r>
+            <a:r>
               <a:rPr lang="en-GB" baseline="0" dirty="0"/>
-              <a:t>With my experience in DevOps and Cyber Security, I’m happy to lead the effort for </a:t>
+              <a:t>to lead the effort for </a:t>
             </a:r>
             <a:r>
               <a:rPr lang="en-GB" baseline="0" dirty="0" err="1"/>
@@ -2544,41 +2746,45 @@
           </a:p>
           <a:p>
             <a:r>
+              <a:rPr lang="en-GB" baseline="0" dirty="0" smtClean="0"/>
+              <a:t>Is: Overview; </a:t>
+            </a:r>
+            <a:r>
               <a:rPr lang="en-GB" baseline="0" dirty="0"/>
-              <a:t>Now a word on what this presentation is, and more importantly, what this presentation is not.  This presentation is an overview of what </a:t>
-            </a:r>
-            <a:r>
-              <a:rPr lang="en-GB" baseline="0" dirty="0" err="1"/>
-              <a:t>DeSecOps</a:t>
+              <a:t>Why is it important; Why it isn’t just “shift-left”; and Where to start.</a:t>
+            </a:r>
+          </a:p>
+          <a:p>
+            <a:endParaRPr lang="en-GB" baseline="0" dirty="0"/>
+          </a:p>
+          <a:p>
+            <a:r>
+              <a:rPr lang="en-GB" baseline="0" dirty="0" smtClean="0"/>
+              <a:t>Is NOT: specific </a:t>
             </a:r>
             <a:r>
               <a:rPr lang="en-GB" baseline="0" dirty="0"/>
-              <a:t> is; Why is it important; Why it isn’t just “shift-left”; and Where to start.</a:t>
-            </a:r>
-          </a:p>
-          <a:p>
-            <a:endParaRPr lang="en-GB" baseline="0" dirty="0"/>
-          </a:p>
-          <a:p>
+              <a:t>tooling or </a:t>
+            </a:r>
+            <a:r>
+              <a:rPr lang="en-GB" baseline="0" dirty="0" smtClean="0"/>
+              <a:t>vendors; </a:t>
+            </a:r>
+            <a:r>
+              <a:rPr lang="en-GB" baseline="0" dirty="0" err="1" smtClean="0"/>
+              <a:t>indepth</a:t>
+            </a:r>
+            <a:r>
+              <a:rPr lang="en-GB" baseline="0" dirty="0" smtClean="0"/>
+              <a:t> course; the </a:t>
+            </a:r>
             <a:r>
               <a:rPr lang="en-GB" baseline="0" dirty="0"/>
-              <a:t>This presentation is not a discussion about specific tooling or vendors.  It is not a </a:t>
-            </a:r>
-            <a:r>
-              <a:rPr lang="en-GB" baseline="0" dirty="0" err="1"/>
-              <a:t>indepth</a:t>
-            </a:r>
-            <a:r>
-              <a:rPr lang="en-GB" baseline="0" dirty="0"/>
-              <a:t> course of best practice.  Most importantly, it is not the silver bullet that will immediately implement </a:t>
-            </a:r>
-            <a:r>
-              <a:rPr lang="en-GB" baseline="0" dirty="0" err="1"/>
-              <a:t>DevSecOps</a:t>
-            </a:r>
-            <a:r>
-              <a:rPr lang="en-GB" baseline="0" dirty="0"/>
-              <a:t> for you!</a:t>
+              <a:t>silver </a:t>
+            </a:r>
+            <a:r>
+              <a:rPr lang="en-GB" baseline="0" dirty="0" smtClean="0"/>
+              <a:t>bullet</a:t>
             </a:r>
             <a:endParaRPr lang="en-GB" dirty="0"/>
           </a:p>
@@ -2725,32 +2931,70 @@
           <a:lstStyle/>
           <a:p>
             <a:r>
-              <a:rPr lang="en-GB" sz="700" b="1" dirty="0">
+              <a:rPr lang="en-GB" sz="700" b="0" baseline="0" dirty="0" smtClean="0">
                 <a:solidFill>
                   <a:schemeClr val="tx1"/>
                 </a:solidFill>
               </a:rPr>
-              <a:t>How we’re funded</a:t>
-            </a:r>
-          </a:p>
-          <a:p>
-            <a:r>
-              <a:rPr lang="en-GB" sz="700" b="1" dirty="0">
+              <a:t>P</a:t>
+            </a:r>
+            <a:r>
+              <a:rPr lang="en-GB" sz="700" dirty="0" smtClean="0">
                 <a:solidFill>
                   <a:schemeClr val="tx1"/>
                 </a:solidFill>
               </a:rPr>
-              <a:t>Public</a:t>
-            </a:r>
-            <a:r>
-              <a:rPr lang="en-GB" sz="700" b="1" baseline="0" dirty="0">
+              <a:t>ublic body the bank of banks</a:t>
+            </a:r>
+          </a:p>
+          <a:p>
+            <a:r>
+              <a:rPr lang="en-GB" sz="700" b="0" baseline="0" dirty="0" smtClean="0">
                 <a:solidFill>
                   <a:schemeClr val="tx1"/>
                 </a:solidFill>
               </a:rPr>
-              <a:t> facing</a:t>
-            </a:r>
-            <a:endParaRPr lang="en-GB" sz="700" b="1" dirty="0">
+              <a:t>Charge firms to be regulated (approx. 1400)</a:t>
+            </a:r>
+          </a:p>
+          <a:p>
+            <a:r>
+              <a:rPr lang="en-GB" sz="700" b="0" baseline="0" dirty="0" smtClean="0">
+                <a:solidFill>
+                  <a:schemeClr val="tx1"/>
+                </a:solidFill>
+              </a:rPr>
+              <a:t>Investing capital for 300 years</a:t>
+            </a:r>
+          </a:p>
+          <a:p>
+            <a:r>
+              <a:rPr lang="en-GB" sz="700" b="0" baseline="0" dirty="0" smtClean="0">
+                <a:solidFill>
+                  <a:schemeClr val="tx1"/>
+                </a:solidFill>
+              </a:rPr>
+              <a:t>Official Bank Rate, currently at 3.5% with next decision Thursday 2</a:t>
+            </a:r>
+            <a:r>
+              <a:rPr lang="en-GB" sz="700" b="0" baseline="30000" dirty="0" smtClean="0">
+                <a:solidFill>
+                  <a:schemeClr val="tx1"/>
+                </a:solidFill>
+              </a:rPr>
+              <a:t>nd</a:t>
+            </a:r>
+            <a:r>
+              <a:rPr lang="en-GB" sz="700" b="0" baseline="0" dirty="0" smtClean="0">
+                <a:solidFill>
+                  <a:schemeClr val="tx1"/>
+                </a:solidFill>
+              </a:rPr>
+              <a:t> Feb</a:t>
+            </a:r>
+          </a:p>
+          <a:p>
+            <a:endParaRPr lang="en-GB" sz="700" b="0" dirty="0" smtClean="0">
               <a:solidFill>
                 <a:schemeClr val="tx1"/>
               </a:solidFill>
@@ -2758,97 +3002,60 @@
           </a:p>
           <a:p>
             <a:r>
-              <a:rPr lang="en-GB" sz="700" dirty="0">
+              <a:rPr lang="en-GB" sz="700" b="0" dirty="0" smtClean="0">
                 <a:solidFill>
                   <a:schemeClr val="tx1"/>
                 </a:solidFill>
               </a:rPr>
-              <a:t>Although we are a public body, we do not get a budget from the UK Treasury. Instead, we generate the funds we need for our work by:</a:t>
-            </a:r>
-          </a:p>
-          <a:p>
-            <a:pPr marL="171450" indent="-171450">
-              <a:buFont typeface="Arial" panose="020B0604020202020204" pitchFamily="34" charset="0"/>
-              <a:buChar char="•"/>
-            </a:pPr>
-            <a:r>
-              <a:rPr lang="en-GB" sz="700" dirty="0">
+              <a:t>Banknotes (England only)</a:t>
+            </a:r>
+          </a:p>
+          <a:p>
+            <a:endParaRPr lang="en-GB" sz="700" b="0" dirty="0" smtClean="0">
+              <a:solidFill>
+                <a:schemeClr val="tx1"/>
+              </a:solidFill>
+            </a:endParaRPr>
+          </a:p>
+          <a:p>
+            <a:r>
+              <a:rPr lang="en-GB" sz="700" b="0" dirty="0" smtClean="0">
                 <a:solidFill>
                   <a:schemeClr val="tx1"/>
                 </a:solidFill>
               </a:rPr>
-              <a:t>investing the money banks have to hold with us (this is called the 'Cash Ratio Deposit scheme')</a:t>
-            </a:r>
-          </a:p>
-          <a:p>
-            <a:pPr marL="171450" indent="-171450">
-              <a:buFont typeface="Arial" panose="020B0604020202020204" pitchFamily="34" charset="0"/>
-              <a:buChar char="•"/>
-            </a:pPr>
-            <a:r>
-              <a:rPr lang="en-GB" sz="700" dirty="0">
+              <a:t>RTGS since 1996</a:t>
+            </a:r>
+            <a:endParaRPr lang="en-GB" sz="700" b="0" baseline="0" dirty="0" smtClean="0">
+              <a:solidFill>
+                <a:schemeClr val="tx1"/>
+              </a:solidFill>
+            </a:endParaRPr>
+          </a:p>
+          <a:p>
+            <a:r>
+              <a:rPr lang="en-GB" sz="700" b="0" baseline="0" dirty="0" smtClean="0">
                 <a:solidFill>
                   <a:schemeClr val="tx1"/>
                 </a:solidFill>
               </a:rPr>
-              <a:t>charging the firms we regulate a fee</a:t>
-            </a:r>
-          </a:p>
-          <a:p>
-            <a:pPr marL="171450" indent="-171450">
-              <a:buFont typeface="Arial" panose="020B0604020202020204" pitchFamily="34" charset="0"/>
-              <a:buChar char="•"/>
-            </a:pPr>
-            <a:r>
-              <a:rPr lang="en-GB" sz="700" dirty="0">
+              <a:t>£720B a day</a:t>
+            </a:r>
+          </a:p>
+          <a:p>
+            <a:r>
+              <a:rPr lang="en-GB" sz="700" b="0" baseline="0" dirty="0" smtClean="0">
                 <a:solidFill>
                   <a:schemeClr val="tx1"/>
                 </a:solidFill>
               </a:rPr>
-              <a:t>providing banking services to our customers, who include overseas central banks</a:t>
-            </a:r>
-          </a:p>
-          <a:p>
-            <a:pPr marL="171450" indent="-171450">
-              <a:buFont typeface="Arial" panose="020B0604020202020204" pitchFamily="34" charset="0"/>
-              <a:buChar char="•"/>
-            </a:pPr>
-            <a:r>
-              <a:rPr lang="en-GB" sz="700" dirty="0">
-                <a:solidFill>
-                  <a:schemeClr val="tx1"/>
-                </a:solidFill>
-              </a:rPr>
-              <a:t>charging for the cost of producing banknotes</a:t>
-            </a:r>
-          </a:p>
-          <a:p>
-            <a:pPr marL="171450" indent="-171450">
-              <a:buFont typeface="Arial" panose="020B0604020202020204" pitchFamily="34" charset="0"/>
-              <a:buChar char="•"/>
-            </a:pPr>
-            <a:r>
-              <a:rPr lang="en-GB" sz="700" dirty="0">
-                <a:solidFill>
-                  <a:schemeClr val="tx1"/>
-                </a:solidFill>
-              </a:rPr>
-              <a:t>charging a management fee for services we provide to government agencies</a:t>
-            </a:r>
-          </a:p>
-          <a:p>
-            <a:pPr marL="171450" indent="-171450">
-              <a:buFont typeface="Arial" panose="020B0604020202020204" pitchFamily="34" charset="0"/>
-              <a:buChar char="•"/>
-            </a:pPr>
-            <a:r>
-              <a:rPr lang="en-GB" sz="700" dirty="0">
-                <a:solidFill>
-                  <a:schemeClr val="tx1"/>
-                </a:solidFill>
-              </a:rPr>
-              <a:t>investing the capital we have built up over 300 years</a:t>
-            </a:r>
+              <a:t>£1T end of September</a:t>
+            </a:r>
+            <a:endParaRPr lang="en-GB" sz="700" b="0" dirty="0" smtClean="0">
+              <a:solidFill>
+                <a:schemeClr val="tx1"/>
+              </a:solidFill>
+            </a:endParaRPr>
           </a:p>
           <a:p>
             <a:endParaRPr lang="en-GB" sz="700" dirty="0">
@@ -2859,95 +3066,12 @@
           </a:p>
           <a:p>
             <a:r>
-              <a:rPr lang="en-GB" sz="700" b="1" dirty="0">
+              <a:rPr lang="en-GB" sz="700" baseline="0" dirty="0" smtClean="0">
                 <a:solidFill>
                   <a:schemeClr val="tx1"/>
                 </a:solidFill>
               </a:rPr>
-              <a:t>The magic behind</a:t>
-            </a:r>
-            <a:r>
-              <a:rPr lang="en-GB" sz="700" b="1" baseline="0" dirty="0">
-                <a:solidFill>
-                  <a:schemeClr val="tx1"/>
-                </a:solidFill>
-              </a:rPr>
-              <a:t> the curtains</a:t>
-            </a:r>
-            <a:endParaRPr lang="en-GB" sz="700" b="1" dirty="0">
-              <a:solidFill>
-                <a:schemeClr val="tx1"/>
-              </a:solidFill>
-            </a:endParaRPr>
-          </a:p>
-          <a:p>
-            <a:r>
-              <a:rPr lang="en-GB" sz="700" dirty="0">
-                <a:solidFill>
-                  <a:schemeClr val="tx1"/>
-                </a:solidFill>
-              </a:rPr>
-              <a:t>The payments landscape continues to change at a rapid pace, reflecting changes in the needs of households and companies, changes in technology, and an evolving regulatory landscape. The Bank has operated the Real-Time Gross Settlement (RTGS) system since its introduction in 1996. RTGS lies at the heart of every payment in the UK and on average settles over £720 billion on an average day; broadly equivalent to the UK’s GDP every three days. RTGS settled £1 Trillion on its peak value day (30 September 2022) in the period. Banks and other financial institutions use accounts in RTGS to settle money owed to each other through the UK’s payment systems. The successful management and operation of RTGS directly supports the Bank’s mission to promote the good of the people of the United Kingdom by maintaining monetary and financial stability. As well as providing settlement services, RTGS is also the mechanism through which the Bank implements monetary policy decisions and provides liquidity to the UK’s financial system</a:t>
-            </a:r>
-          </a:p>
-          <a:p>
-            <a:endParaRPr lang="en-GB" sz="700" dirty="0">
-              <a:solidFill>
-                <a:schemeClr val="tx1"/>
-              </a:solidFill>
-            </a:endParaRPr>
-          </a:p>
-          <a:p>
-            <a:r>
-              <a:rPr lang="en-GB" sz="700" dirty="0">
-                <a:solidFill>
-                  <a:schemeClr val="tx1"/>
-                </a:solidFill>
-              </a:rPr>
-              <a:t>Last year, RTGS settled an average of over £720 billion each working day; broadly equivalent to the UK’s GDP every three days. RTGS settled £1 Trillion on its peak value day (30 September 2022) in that period. The vast majority of the value settled (99%) is from CHAPS and CREST.</a:t>
-            </a:r>
-          </a:p>
-          <a:p>
-            <a:endParaRPr lang="en-GB" sz="700" dirty="0">
-              <a:solidFill>
-                <a:schemeClr val="tx1"/>
-              </a:solidFill>
-            </a:endParaRPr>
-          </a:p>
-          <a:p>
-            <a:r>
-              <a:rPr lang="en-GB" sz="700" b="1" dirty="0">
-                <a:solidFill>
-                  <a:schemeClr val="tx1"/>
-                </a:solidFill>
-              </a:rPr>
-              <a:t>Now</a:t>
-            </a:r>
-            <a:r>
-              <a:rPr lang="en-GB" sz="700" b="1" baseline="0" dirty="0">
-                <a:solidFill>
-                  <a:schemeClr val="tx1"/>
-                </a:solidFill>
-              </a:rPr>
-              <a:t> and looking into t</a:t>
-            </a:r>
-            <a:r>
-              <a:rPr lang="en-GB" sz="700" b="1" dirty="0">
-                <a:solidFill>
-                  <a:schemeClr val="tx1"/>
-                </a:solidFill>
-              </a:rPr>
-              <a:t>he Future</a:t>
-            </a:r>
-          </a:p>
-          <a:p>
-            <a:r>
-              <a:rPr lang="en-GB" sz="700" dirty="0">
-                <a:solidFill>
-                  <a:schemeClr val="tx1"/>
-                </a:solidFill>
-              </a:rPr>
-              <a:t>Due to the</a:t>
+              <a:t>Committed </a:t>
             </a:r>
             <a:r>
               <a:rPr lang="en-GB" sz="700" baseline="0" dirty="0">
@@ -2955,7 +3079,7 @@
                   <a:schemeClr val="tx1"/>
                 </a:solidFill>
               </a:rPr>
-              <a:t> level of security around our services and the Bank’s risk-adverse attitude we became very comfortable building and running everything on premise.  Our cloud adoption was also stunted by the attitudes of some executives within Technology, but the Bank is now committed to moving 80% of our services to the Cloud by 2030.  So moving securely at speed is imperative.</a:t>
+              <a:t>to moving 80% of our services to the Cloud by 2030.  So moving securely at speed is imperative.</a:t>
             </a:r>
             <a:endParaRPr lang="en-GB" sz="700" dirty="0">
               <a:solidFill>
@@ -3046,57 +3170,71 @@
           <a:lstStyle/>
           <a:p>
             <a:r>
+              <a:rPr lang="en-GB" baseline="0" dirty="0" smtClean="0"/>
+              <a:t>Small </a:t>
+            </a:r>
+            <a:r>
+              <a:rPr lang="en-GB" baseline="0" dirty="0"/>
+              <a:t>teams working independently to implement their features, validating correctness in pre-production environments, with deployments into production happening predictably, quickly, safely, and securely, throughout the business day.</a:t>
+            </a:r>
+          </a:p>
+          <a:p>
+            <a:r>
+              <a:rPr lang="en-GB" baseline="0" dirty="0"/>
+              <a:t>But why is reality not like the books</a:t>
+            </a:r>
+            <a:r>
+              <a:rPr lang="en-GB" baseline="0" dirty="0" smtClean="0"/>
+              <a:t>?</a:t>
+            </a:r>
+          </a:p>
+          <a:p>
+            <a:endParaRPr lang="en-GB" baseline="0" dirty="0" smtClean="0"/>
+          </a:p>
+          <a:p>
+            <a:r>
+              <a:rPr lang="en-GB" dirty="0" smtClean="0"/>
+              <a:t>As </a:t>
+            </a:r>
+            <a:r>
               <a:rPr lang="en-GB" dirty="0"/>
-              <a:t>Hopefully we all know</a:t>
+              <a:t>a developer</a:t>
             </a:r>
             <a:r>
               <a:rPr lang="en-GB" baseline="0" dirty="0"/>
-              <a:t> what good DevOps looks like.  Or at least we have read what it is supposed to look like.</a:t>
-            </a:r>
-          </a:p>
-          <a:p>
+              <a:t> </a:t>
+            </a:r>
+            <a:r>
+              <a:rPr lang="en-GB" baseline="0" dirty="0" smtClean="0"/>
+              <a:t>/ DevOps </a:t>
+            </a:r>
             <a:r>
               <a:rPr lang="en-GB" baseline="0" dirty="0"/>
-              <a:t>Small teams working independently to implement their features, validating correctness in pre-production environments, with deployments into production happening predictably, quickly, safely, and securely, throughout the business day.</a:t>
-            </a:r>
-          </a:p>
-          <a:p>
+              <a:t>lead </a:t>
+            </a:r>
+            <a:r>
+              <a:rPr lang="en-GB" baseline="0" dirty="0" smtClean="0"/>
+              <a:t>/ Ops </a:t>
+            </a:r>
             <a:r>
               <a:rPr lang="en-GB" baseline="0" dirty="0"/>
-              <a:t>But why is reality not like the books?  Having worked across multiple roles, I have some strong feelings about this!</a:t>
-            </a:r>
-            <a:endParaRPr lang="en-GB" dirty="0"/>
-          </a:p>
-          <a:p>
-            <a:r>
-              <a:rPr lang="en-GB" dirty="0"/>
-              <a:t>As a developer</a:t>
+              <a:t>lead </a:t>
+            </a:r>
+            <a:endParaRPr lang="en-GB" baseline="0" dirty="0" smtClean="0"/>
+          </a:p>
+          <a:p>
+            <a:r>
+              <a:rPr lang="en-GB" baseline="0" dirty="0" smtClean="0"/>
+              <a:t>Finally</a:t>
             </a:r>
             <a:r>
               <a:rPr lang="en-GB" baseline="0" dirty="0"/>
-              <a:t> I saw Cyber Security as a blocker to my freedom.  It was stopping me using all the tools and code-snippets I found on the internet.  I would avoid Cyber people because they were the department of “no”.</a:t>
-            </a:r>
-          </a:p>
-          <a:p>
-            <a:r>
-              <a:rPr lang="en-GB" baseline="0" dirty="0"/>
-              <a:t>As a DevOps lead I saw Cyber as an impediment to innovation.  Why couldn’t I have admin rights on every machine within the enterprise so I can run unsigned PowerShell scripts to performed deployments?</a:t>
-            </a:r>
-          </a:p>
-          <a:p>
-            <a:r>
-              <a:rPr lang="en-GB" baseline="0" dirty="0"/>
-              <a:t>As an Ops lead I saw Cyber as the reason my new features were taking so long to reach production.  </a:t>
-            </a:r>
-          </a:p>
-          <a:p>
-            <a:r>
-              <a:rPr lang="en-GB" baseline="0" dirty="0"/>
-              <a:t>Finally, as a Cyber Analyst I saw that I was an idiot…. But in my defence, it wasn’t all my fault.  Throughout the Technology department Cyber Security and their policies were perceived as obstacles to be worked-around.  Their lack of open engagement supported their clandestine reputation.</a:t>
-            </a:r>
-            <a:endParaRPr lang="en-GB" dirty="0"/>
-          </a:p>
-          <a:p>
+              <a:t>, as a Cyber Analyst I saw that I was an </a:t>
+            </a:r>
+            <a:r>
+              <a:rPr lang="en-GB" baseline="0" dirty="0" smtClean="0"/>
+              <a:t>idiot</a:t>
+            </a:r>
             <a:endParaRPr lang="en-GB" dirty="0"/>
           </a:p>
         </p:txBody>
@@ -3182,18 +3320,37 @@
           <a:lstStyle/>
           <a:p>
             <a:r>
-              <a:rPr lang="en-GB" dirty="0"/>
-              <a:t>So, how</a:t>
+              <a:rPr lang="en-GB" dirty="0" smtClean="0"/>
+              <a:t>W</a:t>
+            </a:r>
+            <a:r>
+              <a:rPr lang="en-GB" baseline="0" dirty="0" smtClean="0"/>
+              <a:t>here </a:t>
             </a:r>
             <a:r>
               <a:rPr lang="en-GB" baseline="0" dirty="0"/>
-              <a:t> do we fix it, and where should Security live in the SDLC?  Well … everywhere.</a:t>
-            </a:r>
-          </a:p>
-          <a:p>
+              <a:t>should Security </a:t>
+            </a:r>
+            <a:r>
+              <a:rPr lang="en-GB" baseline="0" dirty="0" smtClean="0"/>
+              <a:t>live … everywhere</a:t>
+            </a:r>
             <a:r>
               <a:rPr lang="en-GB" baseline="0" dirty="0"/>
-              <a:t>Work must be done to create a culture of collaboration between development, operations, and security with engagement being established as the earliest stages of a project or change, and running throughout the lifecycle.</a:t>
+              <a:t>.</a:t>
+            </a:r>
+          </a:p>
+          <a:p>
+            <a:endParaRPr lang="en-GB" baseline="0" dirty="0" smtClean="0"/>
+          </a:p>
+          <a:p>
+            <a:r>
+              <a:rPr lang="en-GB" baseline="0" dirty="0" smtClean="0"/>
+              <a:t>Culture </a:t>
+            </a:r>
+            <a:r>
+              <a:rPr lang="en-GB" baseline="0" dirty="0"/>
+              <a:t>of collaboration between development, operations, and security with engagement being established as the earliest stages of a project or change, and running throughout the lifecycle.</a:t>
             </a:r>
           </a:p>
           <a:p>
@@ -3201,18 +3358,43 @@
           </a:p>
           <a:p>
             <a:r>
+              <a:rPr lang="en-GB" baseline="0" dirty="0" smtClean="0"/>
+              <a:t>Security</a:t>
+            </a:r>
+            <a:r>
               <a:rPr lang="en-GB" baseline="0" dirty="0"/>
-              <a:t>Too often Security, like testing, is an afterthought.  Problems are found too late to be corrected in time, and the system moves forward, running at risk.  Here starts the technical debt spiral.  Promises of, “we’ll fix this later” are rarely delivered due to other pressures.</a:t>
-            </a:r>
-          </a:p>
-          <a:p>
+              <a:t>, like </a:t>
+            </a:r>
+            <a:r>
+              <a:rPr lang="en-GB" baseline="0" dirty="0" smtClean="0"/>
+              <a:t>testing</a:t>
+            </a:r>
+          </a:p>
+          <a:p>
+            <a:r>
+              <a:rPr lang="en-GB" baseline="0" dirty="0" smtClean="0"/>
+              <a:t>Problems too late starts </a:t>
+            </a:r>
+            <a:r>
+              <a:rPr lang="en-GB" baseline="0" dirty="0"/>
+              <a:t>the technical debt spiral. </a:t>
+            </a:r>
+            <a:endParaRPr lang="en-GB" baseline="0" dirty="0" smtClean="0"/>
+          </a:p>
+          <a:p>
+            <a:r>
+              <a:rPr lang="en-GB" baseline="0" dirty="0" smtClean="0"/>
+              <a:t>“We’ll </a:t>
+            </a:r>
+            <a:r>
+              <a:rPr lang="en-GB" baseline="0" dirty="0"/>
+              <a:t>fix this later</a:t>
+            </a:r>
+            <a:r>
+              <a:rPr lang="en-GB" baseline="0" dirty="0" smtClean="0"/>
+              <a:t>”</a:t>
+            </a:r>
             <a:endParaRPr lang="en-GB" baseline="0" dirty="0"/>
-          </a:p>
-          <a:p>
-            <a:r>
-              <a:rPr lang="en-GB" baseline="0" dirty="0"/>
-              <a:t>Add in Cloud to this situation and part of this debt could lead to a major compromise or data breach.</a:t>
-            </a:r>
           </a:p>
           <a:p>
             <a:endParaRPr lang="en-GB" baseline="0" dirty="0"/>
@@ -3317,8 +3499,24 @@
           <a:lstStyle/>
           <a:p>
             <a:r>
+              <a:rPr lang="en-GB" dirty="0" smtClean="0"/>
+              <a:t>Source control</a:t>
+            </a:r>
+            <a:r>
+              <a:rPr lang="en-GB" baseline="0" dirty="0"/>
+              <a:t> </a:t>
+            </a:r>
+            <a:r>
+              <a:rPr lang="en-GB" baseline="0" dirty="0" smtClean="0"/>
+              <a:t>/</a:t>
+            </a:r>
+            <a:r>
+              <a:rPr lang="en-GB" dirty="0" smtClean="0"/>
+              <a:t> Visual </a:t>
+            </a:r>
+            <a:r>
               <a:rPr lang="en-GB" dirty="0"/>
-              <a:t>Firstly … I’m going to assume that everyone listening to me is aware of, and uses source control. Even if it is Visual Source Safe!?!?</a:t>
+              <a:t>Source Safe!?!?</a:t>
             </a:r>
           </a:p>
           <a:p>
@@ -3326,8 +3524,28 @@
           </a:p>
           <a:p>
             <a:r>
+              <a:rPr lang="en-GB" dirty="0" smtClean="0"/>
+              <a:t>August </a:t>
+            </a:r>
+            <a:r>
               <a:rPr lang="en-GB" dirty="0"/>
-              <a:t>In August 2019, GitHub was called out in a US lawsuit following the Capital One breach. The reason? Allowing social security numbers to be stored in a Git repository.</a:t>
+              <a:t>2019, GitHub </a:t>
+            </a:r>
+            <a:r>
+              <a:rPr lang="en-GB" dirty="0" smtClean="0"/>
+              <a:t>lawsuit Capital One.</a:t>
+            </a:r>
+            <a:r>
+              <a:rPr lang="en-GB" baseline="0" dirty="0" smtClean="0"/>
+              <a:t> </a:t>
+            </a:r>
+            <a:r>
+              <a:rPr lang="en-GB" dirty="0" smtClean="0"/>
+              <a:t> </a:t>
+            </a:r>
+            <a:r>
+              <a:rPr lang="en-GB" dirty="0"/>
+              <a:t>Allowing social security numbers to be stored in a Git repository.</a:t>
             </a:r>
           </a:p>
           <a:p>
@@ -3335,8 +3553,22 @@
           </a:p>
           <a:p>
             <a:r>
+              <a:rPr lang="en-GB" dirty="0" smtClean="0"/>
+              <a:t>October </a:t>
+            </a:r>
+            <a:r>
               <a:rPr lang="en-GB" dirty="0"/>
-              <a:t>In October 2019, </a:t>
+              <a:t>2019, </a:t>
+            </a:r>
+            <a:r>
+              <a:rPr lang="en-GB" b="0" i="0" dirty="0" smtClean="0">
+                <a:solidFill>
+                  <a:srgbClr val="070707"/>
+                </a:solidFill>
+                <a:effectLst/>
+                <a:latin typeface="Georgia" panose="02040502050405020303" pitchFamily="18" charset="0"/>
+              </a:rPr>
+              <a:t>Starbucks </a:t>
             </a:r>
             <a:r>
               <a:rPr lang="en-GB" b="0" i="0" dirty="0">
@@ -3346,7 +3578,27 @@
                 <a:effectLst/>
                 <a:latin typeface="Georgia" panose="02040502050405020303" pitchFamily="18" charset="0"/>
               </a:rPr>
-              <a:t>one misstep from developers at Starbucks left exposed an API key that could be used by an attacker to access internal systems and manipulate the list of authorized users.  Lucky the vulnerability was reported as part of a bug bounty program and quickly resolved.</a:t>
+              <a:t>left exposed an API key </a:t>
+            </a:r>
+            <a:r>
+              <a:rPr lang="en-GB" b="0" i="0" dirty="0" smtClean="0">
+                <a:solidFill>
+                  <a:srgbClr val="070707"/>
+                </a:solidFill>
+                <a:effectLst/>
+                <a:latin typeface="Georgia" panose="02040502050405020303" pitchFamily="18" charset="0"/>
+              </a:rPr>
+              <a:t>reported </a:t>
+            </a:r>
+            <a:r>
+              <a:rPr lang="en-GB" b="0" i="0" dirty="0">
+                <a:solidFill>
+                  <a:srgbClr val="070707"/>
+                </a:solidFill>
+                <a:effectLst/>
+                <a:latin typeface="Georgia" panose="02040502050405020303" pitchFamily="18" charset="0"/>
+              </a:rPr>
+              <a:t>as part of a bug bounty program and quickly resolved.</a:t>
             </a:r>
           </a:p>
           <a:p>
@@ -3360,6 +3612,16 @@
           </a:p>
           <a:p>
             <a:r>
+              <a:rPr lang="en-GB" b="0" i="0" dirty="0" smtClean="0">
+                <a:solidFill>
+                  <a:srgbClr val="070707"/>
+                </a:solidFill>
+                <a:effectLst/>
+                <a:latin typeface="Georgia" panose="02040502050405020303" pitchFamily="18" charset="0"/>
+              </a:rPr>
+              <a:t>January </a:t>
+            </a:r>
+            <a:r>
               <a:rPr lang="en-GB" b="0" i="0" dirty="0">
                 <a:solidFill>
                   <a:srgbClr val="070707"/>
@@ -3367,7 +3629,27 @@
                 <a:effectLst/>
                 <a:latin typeface="Georgia" panose="02040502050405020303" pitchFamily="18" charset="0"/>
               </a:rPr>
-              <a:t>In January 2021, a misconfigured Git server at Nissan North America lead to the leak of the source code of the company's mobile apps and internal tools. A Git server was left publicly exposed with a default username and password of admin/admin.</a:t>
+              <a:t>2021, a misconfigured Git server at Nissan North America lead to the leak </a:t>
+            </a:r>
+            <a:r>
+              <a:rPr lang="en-GB" b="0" i="0" dirty="0" smtClean="0">
+                <a:solidFill>
+                  <a:srgbClr val="070707"/>
+                </a:solidFill>
+                <a:effectLst/>
+                <a:latin typeface="Georgia" panose="02040502050405020303" pitchFamily="18" charset="0"/>
+              </a:rPr>
+              <a:t>left </a:t>
+            </a:r>
+            <a:r>
+              <a:rPr lang="en-GB" b="0" i="0" dirty="0">
+                <a:solidFill>
+                  <a:srgbClr val="070707"/>
+                </a:solidFill>
+                <a:effectLst/>
+                <a:latin typeface="Georgia" panose="02040502050405020303" pitchFamily="18" charset="0"/>
+              </a:rPr>
+              <a:t>publicly exposed with a default username and password of admin/admin.</a:t>
             </a:r>
           </a:p>
           <a:p>
@@ -3381,6 +3663,16 @@
           </a:p>
           <a:p>
             <a:r>
+              <a:rPr lang="en-GB" b="0" i="0" dirty="0" smtClean="0">
+                <a:solidFill>
+                  <a:srgbClr val="070707"/>
+                </a:solidFill>
+                <a:effectLst/>
+                <a:latin typeface="Georgia" panose="02040502050405020303" pitchFamily="18" charset="0"/>
+              </a:rPr>
+              <a:t>December </a:t>
+            </a:r>
+            <a:r>
               <a:rPr lang="en-GB" b="0" i="0" dirty="0">
                 <a:solidFill>
                   <a:srgbClr val="070707"/>
@@ -3388,7 +3680,67 @@
                 <a:effectLst/>
                 <a:latin typeface="Georgia" panose="02040502050405020303" pitchFamily="18" charset="0"/>
               </a:rPr>
-              <a:t>More recently, in December 2022, Okta reported a breach that included the unauthorised downloading of source code.  Access was possible through the use of stolen authorisation keys and could have been related to an extension phishing campaign in September of last year.</a:t>
+              <a:t>2022, </a:t>
+            </a:r>
+            <a:r>
+              <a:rPr lang="en-GB" b="0" i="0" dirty="0" err="1">
+                <a:solidFill>
+                  <a:srgbClr val="070707"/>
+                </a:solidFill>
+                <a:effectLst/>
+                <a:latin typeface="Georgia" panose="02040502050405020303" pitchFamily="18" charset="0"/>
+              </a:rPr>
+              <a:t>Okta</a:t>
+            </a:r>
+            <a:r>
+              <a:rPr lang="en-GB" b="0" i="0" dirty="0">
+                <a:solidFill>
+                  <a:srgbClr val="070707"/>
+                </a:solidFill>
+                <a:effectLst/>
+                <a:latin typeface="Georgia" panose="02040502050405020303" pitchFamily="18" charset="0"/>
+              </a:rPr>
+              <a:t> </a:t>
+            </a:r>
+            <a:r>
+              <a:rPr lang="en-GB" b="0" i="0" dirty="0" smtClean="0">
+                <a:solidFill>
+                  <a:srgbClr val="070707"/>
+                </a:solidFill>
+                <a:effectLst/>
+                <a:latin typeface="Georgia" panose="02040502050405020303" pitchFamily="18" charset="0"/>
+              </a:rPr>
+              <a:t>stolen </a:t>
+            </a:r>
+            <a:r>
+              <a:rPr lang="en-GB" b="0" i="0" dirty="0">
+                <a:solidFill>
+                  <a:srgbClr val="070707"/>
+                </a:solidFill>
+                <a:effectLst/>
+                <a:latin typeface="Georgia" panose="02040502050405020303" pitchFamily="18" charset="0"/>
+              </a:rPr>
+              <a:t>authorisation keys </a:t>
+            </a:r>
+            <a:r>
+              <a:rPr lang="en-GB" b="0" i="0" dirty="0" smtClean="0">
+                <a:solidFill>
+                  <a:srgbClr val="070707"/>
+                </a:solidFill>
+                <a:effectLst/>
+                <a:latin typeface="Georgia" panose="02040502050405020303" pitchFamily="18" charset="0"/>
+              </a:rPr>
+              <a:t>extension </a:t>
+            </a:r>
+            <a:r>
+              <a:rPr lang="en-GB" b="0" i="0" dirty="0">
+                <a:solidFill>
+                  <a:srgbClr val="070707"/>
+                </a:solidFill>
+                <a:effectLst/>
+                <a:latin typeface="Georgia" panose="02040502050405020303" pitchFamily="18" charset="0"/>
+              </a:rPr>
+              <a:t>phishing campaign in September of last year.</a:t>
             </a:r>
           </a:p>
           <a:p>
@@ -3402,6 +3754,16 @@
           </a:p>
           <a:p>
             <a:r>
+              <a:rPr lang="en-GB" b="0" i="0" dirty="0" smtClean="0">
+                <a:solidFill>
+                  <a:srgbClr val="070707"/>
+                </a:solidFill>
+                <a:effectLst/>
+                <a:latin typeface="Georgia" panose="02040502050405020303" pitchFamily="18" charset="0"/>
+              </a:rPr>
+              <a:t>Slack </a:t>
+            </a:r>
+            <a:r>
               <a:rPr lang="en-GB" b="0" i="0" dirty="0">
                 <a:solidFill>
                   <a:srgbClr val="070707"/>
@@ -3409,8 +3771,66 @@
                 <a:effectLst/>
                 <a:latin typeface="Georgia" panose="02040502050405020303" pitchFamily="18" charset="0"/>
               </a:rPr>
-              <a:t>While still reading and digesting the information around the Okta breach, a few days later we got news of an attack on Slack. The incident involves threat actors gaining access to Slack's externally hosted GitHub repositories via a "limited" number of Slack employee tokens that were stolen.</a:t>
-            </a:r>
+              <a:t>incident </a:t>
+            </a:r>
+            <a:r>
+              <a:rPr lang="en-GB" b="0" i="0" dirty="0" smtClean="0">
+                <a:solidFill>
+                  <a:srgbClr val="070707"/>
+                </a:solidFill>
+                <a:effectLst/>
+                <a:latin typeface="Georgia" panose="02040502050405020303" pitchFamily="18" charset="0"/>
+              </a:rPr>
+              <a:t>employee </a:t>
+            </a:r>
+            <a:r>
+              <a:rPr lang="en-GB" b="0" i="0" dirty="0">
+                <a:solidFill>
+                  <a:srgbClr val="070707"/>
+                </a:solidFill>
+                <a:effectLst/>
+                <a:latin typeface="Georgia" panose="02040502050405020303" pitchFamily="18" charset="0"/>
+              </a:rPr>
+              <a:t>tokens that were stolen</a:t>
+            </a:r>
+            <a:r>
+              <a:rPr lang="en-GB" b="0" i="0" dirty="0" smtClean="0">
+                <a:solidFill>
+                  <a:srgbClr val="070707"/>
+                </a:solidFill>
+                <a:effectLst/>
+                <a:latin typeface="Georgia" panose="02040502050405020303" pitchFamily="18" charset="0"/>
+              </a:rPr>
+              <a:t>.</a:t>
+            </a:r>
+          </a:p>
+          <a:p>
+            <a:endParaRPr lang="en-GB" b="0" i="0" dirty="0" smtClean="0">
+              <a:solidFill>
+                <a:srgbClr val="070707"/>
+              </a:solidFill>
+              <a:effectLst/>
+              <a:latin typeface="Georgia" panose="02040502050405020303" pitchFamily="18" charset="0"/>
+            </a:endParaRPr>
+          </a:p>
+          <a:p>
+            <a:r>
+              <a:rPr lang="en-GB" b="0" i="0" dirty="0" smtClean="0">
+                <a:solidFill>
+                  <a:srgbClr val="070707"/>
+                </a:solidFill>
+                <a:effectLst/>
+                <a:latin typeface="Georgia" panose="02040502050405020303" pitchFamily="18" charset="0"/>
+              </a:rPr>
+              <a:t>PayPal breach caused by credential stuffing</a:t>
+            </a:r>
+            <a:endParaRPr lang="en-GB" b="0" i="0" dirty="0">
+              <a:solidFill>
+                <a:srgbClr val="070707"/>
+              </a:solidFill>
+              <a:effectLst/>
+              <a:latin typeface="Georgia" panose="02040502050405020303" pitchFamily="18" charset="0"/>
+            </a:endParaRPr>
           </a:p>
           <a:p>
             <a:endParaRPr lang="en-GB" b="0" i="0" dirty="0">
@@ -3600,8 +4020,40 @@
           <a:lstStyle/>
           <a:p>
             <a:r>
+              <a:rPr lang="en-GB" dirty="0" smtClean="0"/>
+              <a:t>“</a:t>
+            </a:r>
+            <a:r>
               <a:rPr lang="en-GB" dirty="0"/>
-              <a:t>In real terms, developers within an organisation fall within the “80/20” divide.  Any organisation that is more than 1 year old has technical debt, and an ever growing code base.  The 80% typically work on legacy systems fixing bugs and adding features to an already established application.</a:t>
+              <a:t>80/20” </a:t>
+            </a:r>
+            <a:r>
+              <a:rPr lang="en-GB" dirty="0" smtClean="0"/>
+              <a:t>divide</a:t>
+            </a:r>
+          </a:p>
+          <a:p>
+            <a:r>
+              <a:rPr lang="en-GB" dirty="0" smtClean="0"/>
+              <a:t>1 </a:t>
+            </a:r>
+            <a:r>
+              <a:rPr lang="en-GB" dirty="0"/>
+              <a:t>year old has technical </a:t>
+            </a:r>
+            <a:r>
+              <a:rPr lang="en-GB" dirty="0" smtClean="0"/>
+              <a:t>debt</a:t>
+            </a:r>
+          </a:p>
+          <a:p>
+            <a:r>
+              <a:rPr lang="en-GB" dirty="0" smtClean="0"/>
+              <a:t>80</a:t>
+            </a:r>
+            <a:r>
+              <a:rPr lang="en-GB" dirty="0"/>
+              <a:t>% typically work on legacy systems fixing bugs and adding features to an already established application.</a:t>
             </a:r>
           </a:p>
           <a:p>
@@ -3609,8 +4061,20 @@
           </a:p>
           <a:p>
             <a:r>
+              <a:rPr lang="en-GB" baseline="0" dirty="0" smtClean="0"/>
+              <a:t>20</a:t>
+            </a:r>
+            <a:r>
               <a:rPr lang="en-GB" baseline="0" dirty="0"/>
-              <a:t>The other 20% are, typically, more senior or proactive </a:t>
+              <a:t>% </a:t>
+            </a:r>
+            <a:r>
+              <a:rPr lang="en-GB" baseline="0" dirty="0" smtClean="0"/>
+              <a:t>more </a:t>
+            </a:r>
+            <a:r>
+              <a:rPr lang="en-GB" baseline="0" dirty="0"/>
+              <a:t>senior or proactive </a:t>
             </a:r>
             <a:r>
               <a:rPr lang="en-GB" baseline="0" dirty="0" err="1"/>
@@ -3618,7 +4082,31 @@
             </a:r>
             <a:r>
               <a:rPr lang="en-GB" baseline="0" dirty="0"/>
-              <a:t> who want to use all the cool new tools and resources.  They will seek out new processes and work with the latest, possibly less established, components, but are highly trusted.</a:t>
+              <a:t> </a:t>
+            </a:r>
+            <a:r>
+              <a:rPr lang="en-GB" baseline="0" dirty="0" smtClean="0"/>
+              <a:t>seek </a:t>
+            </a:r>
+            <a:r>
+              <a:rPr lang="en-GB" baseline="0" dirty="0"/>
+              <a:t>out new processes </a:t>
+            </a:r>
+            <a:r>
+              <a:rPr lang="en-GB" baseline="0" dirty="0" smtClean="0"/>
+              <a:t>/ </a:t>
+            </a:r>
+            <a:r>
+              <a:rPr lang="en-GB" baseline="0" dirty="0"/>
+              <a:t>latest, possibly less established, </a:t>
+            </a:r>
+            <a:r>
+              <a:rPr lang="en-GB" baseline="0" dirty="0" smtClean="0"/>
+              <a:t>components / </a:t>
+            </a:r>
+            <a:r>
+              <a:rPr lang="en-GB" baseline="0" dirty="0"/>
+              <a:t>highly trusted.</a:t>
             </a:r>
           </a:p>
           <a:p>
@@ -3627,8 +4115,50 @@
           <a:p>
             <a:r>
               <a:rPr lang="en-GB" baseline="0" dirty="0"/>
-              <a:t>Security must support these groups in different ways.  The 80s need the capability to produce security code, have processes to support peer review, understand the resources available in the Cloud, and have a clearly defined toolset to develop and test what they write.  SAST and DAST tools, when combined with a clear feedback loop helps re-enforce positive behaviour.  </a:t>
-            </a:r>
+              <a:t>Security must </a:t>
+            </a:r>
+            <a:r>
+              <a:rPr lang="en-GB" baseline="0" dirty="0" smtClean="0"/>
+              <a:t>support</a:t>
+            </a:r>
+          </a:p>
+          <a:p>
+            <a:r>
+              <a:rPr lang="en-GB" baseline="0" dirty="0" smtClean="0"/>
+              <a:t>80s produce </a:t>
+            </a:r>
+            <a:r>
+              <a:rPr lang="en-GB" baseline="0" dirty="0"/>
+              <a:t>security </a:t>
+            </a:r>
+            <a:r>
+              <a:rPr lang="en-GB" baseline="0" dirty="0" smtClean="0"/>
+              <a:t>code / </a:t>
+            </a:r>
+            <a:r>
+              <a:rPr lang="en-GB" baseline="0" dirty="0"/>
+              <a:t>support peer </a:t>
+            </a:r>
+            <a:r>
+              <a:rPr lang="en-GB" baseline="0" dirty="0" smtClean="0"/>
+              <a:t>review / clearly </a:t>
+            </a:r>
+            <a:r>
+              <a:rPr lang="en-GB" baseline="0" dirty="0"/>
+              <a:t>defined toolset </a:t>
+            </a:r>
+            <a:endParaRPr lang="en-GB" baseline="0" dirty="0" smtClean="0"/>
+          </a:p>
+          <a:p>
+            <a:r>
+              <a:rPr lang="en-GB" baseline="0" dirty="0" smtClean="0"/>
+              <a:t>SAST </a:t>
+            </a:r>
+            <a:r>
+              <a:rPr lang="en-GB" baseline="0" dirty="0"/>
+              <a:t>and DAST tools, when combined with a clear feedback loop helps re-enforce positive behaviour.  </a:t>
+            </a:r>
+            <a:endParaRPr lang="en-GB" baseline="0" dirty="0" smtClean="0"/>
           </a:p>
           <a:p>
             <a:endParaRPr lang="en-GB" baseline="0" dirty="0"/>
@@ -3652,21 +4182,22 @@
               <a:defRPr/>
             </a:pPr>
             <a:r>
+              <a:rPr lang="en-GB" baseline="0" dirty="0" smtClean="0"/>
+              <a:t>Re-use </a:t>
+            </a:r>
+            <a:r>
               <a:rPr lang="en-GB" baseline="0" dirty="0"/>
-              <a:t>Re-use, especially of open source components, is at the centre of a modern and efficient development team, but it also has the ability to introduce security issues.  The log4j vulnerability is still fresh in our minds.  Again, Security must be an enabler and support the use of open source components, but this must be done is a controlled manner.  The culture must move away from developers just jumping onto the internet and grabbing libraries and instead have access to a curated collection of components.  </a:t>
-            </a:r>
-          </a:p>
-          <a:p>
-            <a:endParaRPr lang="en-GB" baseline="0" dirty="0"/>
-          </a:p>
-          <a:p>
+              <a:t>the centre of a modern and efficient development </a:t>
+            </a:r>
+            <a:r>
+              <a:rPr lang="en-GB" baseline="0" dirty="0" smtClean="0"/>
+              <a:t>team / introduce </a:t>
+            </a:r>
             <a:r>
               <a:rPr lang="en-GB" baseline="0" dirty="0"/>
-              <a:t>Things for the 20% can be “slightly” less restricted and should be allowed to innovate by trying new things.  Being part of a “high trust, virtual, team” they should have a deeper understanding of security concerns but be enabled to test-drive new tooling and components.  Although the trust level is much higher, they should still play within a walled garden.  By creating this safe space for innovation and creating a process for new, approved, ways of working to be made available with the 80s, technical improvement can be seen across all teams.</a:t>
-            </a:r>
-          </a:p>
-          <a:p>
-            <a:endParaRPr lang="en-GB" dirty="0"/>
+              <a:t>security issues.  </a:t>
+            </a:r>
+            <a:endParaRPr lang="en-GB" baseline="0" dirty="0" smtClean="0"/>
           </a:p>
           <a:p>
             <a:pPr marL="0" marR="0" lvl="0" indent="0" algn="l" defTabSz="914400" rtl="0" eaLnBrk="1" fontAlgn="auto" latinLnBrk="0" hangingPunct="1">
@@ -3687,9 +4218,288 @@
               <a:defRPr/>
             </a:pPr>
             <a:r>
+              <a:rPr lang="en-GB" baseline="0" dirty="0" smtClean="0"/>
+              <a:t>Log4j</a:t>
+            </a:r>
+          </a:p>
+          <a:p>
+            <a:pPr marL="0" marR="0" lvl="0" indent="0" algn="l" defTabSz="914400" rtl="0" eaLnBrk="1" fontAlgn="auto" latinLnBrk="0" hangingPunct="1">
+              <a:lnSpc>
+                <a:spcPct val="100000"/>
+              </a:lnSpc>
+              <a:spcBef>
+                <a:spcPts val="0"/>
+              </a:spcBef>
+              <a:spcAft>
+                <a:spcPts val="0"/>
+              </a:spcAft>
+              <a:buClrTx/>
+              <a:buSzTx/>
+              <a:buFontTx/>
+              <a:buNone/>
+              <a:tabLst/>
+              <a:defRPr/>
+            </a:pPr>
+            <a:r>
+              <a:rPr lang="en-GB" baseline="0" dirty="0" smtClean="0"/>
+              <a:t>Security enabler </a:t>
+            </a:r>
+            <a:r>
               <a:rPr lang="en-GB" baseline="0" dirty="0"/>
-              <a:t>A virtual community of Secure Code Champions, made up of this highly trusted 20%, can be leveraged to support 80% development teams.  This serves a number of purposes; it gives an opportunity for those interested in increasing their security knowledge through support and training; the team can act as a first point of contact and help triage security questions; they can help imbed processes such as threat modelling directly into the teams workflow.</a:t>
-            </a:r>
+              <a:t>and support the use </a:t>
+            </a:r>
+            <a:endParaRPr lang="en-GB" baseline="0" dirty="0" smtClean="0"/>
+          </a:p>
+          <a:p>
+            <a:pPr marL="0" marR="0" lvl="0" indent="0" algn="l" defTabSz="914400" rtl="0" eaLnBrk="1" fontAlgn="auto" latinLnBrk="0" hangingPunct="1">
+              <a:lnSpc>
+                <a:spcPct val="100000"/>
+              </a:lnSpc>
+              <a:spcBef>
+                <a:spcPts val="0"/>
+              </a:spcBef>
+              <a:spcAft>
+                <a:spcPts val="0"/>
+              </a:spcAft>
+              <a:buClrTx/>
+              <a:buSzTx/>
+              <a:buFontTx/>
+              <a:buNone/>
+              <a:tabLst/>
+              <a:defRPr/>
+            </a:pPr>
+            <a:r>
+              <a:rPr lang="en-GB" baseline="0" dirty="0" smtClean="0"/>
+              <a:t>Culture jumping </a:t>
+            </a:r>
+            <a:r>
+              <a:rPr lang="en-GB" baseline="0" dirty="0"/>
+              <a:t>onto the internet and grabbing libraries </a:t>
+            </a:r>
+            <a:r>
+              <a:rPr lang="en-GB" baseline="0" dirty="0" smtClean="0"/>
+              <a:t>/ </a:t>
+            </a:r>
+            <a:r>
+              <a:rPr lang="en-GB" baseline="0" dirty="0"/>
+              <a:t>curated collection of components.  </a:t>
+            </a:r>
+          </a:p>
+          <a:p>
+            <a:endParaRPr lang="en-GB" baseline="0" dirty="0"/>
+          </a:p>
+          <a:p>
+            <a:r>
+              <a:rPr lang="en-GB" baseline="0" dirty="0" smtClean="0"/>
+              <a:t>20</a:t>
+            </a:r>
+            <a:r>
+              <a:rPr lang="en-GB" baseline="0" dirty="0"/>
+              <a:t>% </a:t>
+            </a:r>
+            <a:r>
+              <a:rPr lang="en-GB" baseline="0" dirty="0" smtClean="0"/>
+              <a:t>“</a:t>
+            </a:r>
+            <a:r>
+              <a:rPr lang="en-GB" baseline="0" dirty="0"/>
+              <a:t>slightly” less restricted </a:t>
+            </a:r>
+            <a:r>
+              <a:rPr lang="en-GB" baseline="0" dirty="0" smtClean="0"/>
+              <a:t>/ innovate.  </a:t>
+            </a:r>
+          </a:p>
+          <a:p>
+            <a:r>
+              <a:rPr lang="en-GB" baseline="0" dirty="0" smtClean="0"/>
+              <a:t>“</a:t>
+            </a:r>
+            <a:r>
+              <a:rPr lang="en-GB" baseline="0" dirty="0"/>
+              <a:t>high trust, virtual, team” </a:t>
+            </a:r>
+            <a:endParaRPr lang="en-GB" baseline="0" dirty="0" smtClean="0"/>
+          </a:p>
+          <a:p>
+            <a:r>
+              <a:rPr lang="en-GB" baseline="0" dirty="0" smtClean="0"/>
+              <a:t>play </a:t>
+            </a:r>
+            <a:r>
+              <a:rPr lang="en-GB" baseline="0" dirty="0"/>
+              <a:t>within a walled </a:t>
+            </a:r>
+            <a:r>
+              <a:rPr lang="en-GB" baseline="0" dirty="0" smtClean="0"/>
+              <a:t>garden</a:t>
+            </a:r>
+          </a:p>
+          <a:p>
+            <a:r>
+              <a:rPr lang="en-GB" baseline="0" dirty="0" smtClean="0"/>
+              <a:t>safe </a:t>
+            </a:r>
+            <a:r>
+              <a:rPr lang="en-GB" baseline="0" dirty="0"/>
+              <a:t>space for innovation and creating a process for new, approved, ways of working to be made available with the 80s, technical improvement can be seen across all teams.</a:t>
+            </a:r>
+          </a:p>
+          <a:p>
+            <a:endParaRPr lang="en-GB" dirty="0"/>
+          </a:p>
+          <a:p>
+            <a:pPr marL="0" marR="0" lvl="0" indent="0" algn="l" defTabSz="914400" rtl="0" eaLnBrk="1" fontAlgn="auto" latinLnBrk="0" hangingPunct="1">
+              <a:lnSpc>
+                <a:spcPct val="100000"/>
+              </a:lnSpc>
+              <a:spcBef>
+                <a:spcPts val="0"/>
+              </a:spcBef>
+              <a:spcAft>
+                <a:spcPts val="0"/>
+              </a:spcAft>
+              <a:buClrTx/>
+              <a:buSzTx/>
+              <a:buFontTx/>
+              <a:buNone/>
+              <a:tabLst/>
+              <a:defRPr/>
+            </a:pPr>
+            <a:r>
+              <a:rPr lang="en-GB" baseline="0" dirty="0" smtClean="0"/>
+              <a:t>Virtual </a:t>
+            </a:r>
+            <a:r>
+              <a:rPr lang="en-GB" baseline="0" dirty="0"/>
+              <a:t>community of Secure Code </a:t>
+            </a:r>
+            <a:r>
+              <a:rPr lang="en-GB" baseline="0" dirty="0" smtClean="0"/>
+              <a:t>Champions</a:t>
+            </a:r>
+          </a:p>
+          <a:p>
+            <a:pPr marL="0" marR="0" lvl="0" indent="0" algn="l" defTabSz="914400" rtl="0" eaLnBrk="1" fontAlgn="auto" latinLnBrk="0" hangingPunct="1">
+              <a:lnSpc>
+                <a:spcPct val="100000"/>
+              </a:lnSpc>
+              <a:spcBef>
+                <a:spcPts val="0"/>
+              </a:spcBef>
+              <a:spcAft>
+                <a:spcPts val="0"/>
+              </a:spcAft>
+              <a:buClrTx/>
+              <a:buSzTx/>
+              <a:buFontTx/>
+              <a:buNone/>
+              <a:tabLst/>
+              <a:defRPr/>
+            </a:pPr>
+            <a:r>
+              <a:rPr lang="en-GB" baseline="0" dirty="0" smtClean="0"/>
+              <a:t>Gives </a:t>
+            </a:r>
+            <a:r>
+              <a:rPr lang="en-GB" baseline="0" dirty="0"/>
+              <a:t>an opportunity for those interested in </a:t>
+            </a:r>
+            <a:r>
+              <a:rPr lang="en-GB" baseline="0" dirty="0" smtClean="0"/>
+              <a:t>security</a:t>
+            </a:r>
+          </a:p>
+          <a:p>
+            <a:pPr marL="0" marR="0" lvl="0" indent="0" algn="l" defTabSz="914400" rtl="0" eaLnBrk="1" fontAlgn="auto" latinLnBrk="0" hangingPunct="1">
+              <a:lnSpc>
+                <a:spcPct val="100000"/>
+              </a:lnSpc>
+              <a:spcBef>
+                <a:spcPts val="0"/>
+              </a:spcBef>
+              <a:spcAft>
+                <a:spcPts val="0"/>
+              </a:spcAft>
+              <a:buClrTx/>
+              <a:buSzTx/>
+              <a:buFontTx/>
+              <a:buNone/>
+              <a:tabLst/>
+              <a:defRPr/>
+            </a:pPr>
+            <a:r>
+              <a:rPr lang="en-GB" baseline="0" dirty="0" smtClean="0"/>
+              <a:t>first </a:t>
+            </a:r>
+            <a:r>
+              <a:rPr lang="en-GB" baseline="0" dirty="0"/>
+              <a:t>point of contact </a:t>
+            </a:r>
+            <a:endParaRPr lang="en-GB" baseline="0" dirty="0" smtClean="0"/>
+          </a:p>
+          <a:p>
+            <a:pPr marL="0" marR="0" lvl="0" indent="0" algn="l" defTabSz="914400" rtl="0" eaLnBrk="1" fontAlgn="auto" latinLnBrk="0" hangingPunct="1">
+              <a:lnSpc>
+                <a:spcPct val="100000"/>
+              </a:lnSpc>
+              <a:spcBef>
+                <a:spcPts val="0"/>
+              </a:spcBef>
+              <a:spcAft>
+                <a:spcPts val="0"/>
+              </a:spcAft>
+              <a:buClrTx/>
+              <a:buSzTx/>
+              <a:buFontTx/>
+              <a:buNone/>
+              <a:tabLst/>
+              <a:defRPr/>
+            </a:pPr>
+            <a:r>
+              <a:rPr lang="en-GB" baseline="0" dirty="0" smtClean="0"/>
+              <a:t>triage </a:t>
+            </a:r>
+            <a:r>
+              <a:rPr lang="en-GB" baseline="0" dirty="0"/>
+              <a:t>security </a:t>
+            </a:r>
+            <a:r>
+              <a:rPr lang="en-GB" baseline="0" dirty="0" smtClean="0"/>
+              <a:t>questions</a:t>
+            </a:r>
+          </a:p>
+          <a:p>
+            <a:pPr marL="0" marR="0" lvl="0" indent="0" algn="l" defTabSz="914400" rtl="0" eaLnBrk="1" fontAlgn="auto" latinLnBrk="0" hangingPunct="1">
+              <a:lnSpc>
+                <a:spcPct val="100000"/>
+              </a:lnSpc>
+              <a:spcBef>
+                <a:spcPts val="0"/>
+              </a:spcBef>
+              <a:spcAft>
+                <a:spcPts val="0"/>
+              </a:spcAft>
+              <a:buClrTx/>
+              <a:buSzTx/>
+              <a:buFontTx/>
+              <a:buNone/>
+              <a:tabLst/>
+              <a:defRPr/>
+            </a:pPr>
+            <a:r>
+              <a:rPr lang="en-GB" baseline="0" dirty="0" smtClean="0"/>
+              <a:t>help </a:t>
+            </a:r>
+            <a:r>
+              <a:rPr lang="en-GB" baseline="0" dirty="0"/>
+              <a:t>imbed processes such as threat </a:t>
+            </a:r>
+            <a:r>
+              <a:rPr lang="en-GB" baseline="0" dirty="0" smtClean="0"/>
+              <a:t>modelling</a:t>
+            </a:r>
+            <a:endParaRPr lang="en-GB" baseline="0" dirty="0"/>
           </a:p>
           <a:p>
             <a:endParaRPr lang="en-GB" dirty="0"/>
@@ -3777,6 +4587,16 @@
           <a:lstStyle/>
           <a:p>
             <a:r>
+              <a:rPr lang="en-GB" b="0" i="0" dirty="0" smtClean="0">
+                <a:solidFill>
+                  <a:srgbClr val="242626"/>
+                </a:solidFill>
+                <a:effectLst/>
+                <a:latin typeface="Fira Sans" panose="020B0503050000020004" pitchFamily="34" charset="0"/>
+              </a:rPr>
+              <a:t>CISOs </a:t>
+            </a:r>
+            <a:r>
               <a:rPr lang="en-GB" b="0" i="0" dirty="0">
                 <a:solidFill>
                   <a:srgbClr val="242626"/>
@@ -3784,7 +4604,7 @@
                 <a:effectLst/>
                 <a:latin typeface="Fira Sans" panose="020B0503050000020004" pitchFamily="34" charset="0"/>
               </a:rPr>
-              <a:t>In a recent report from Dynatrace (Dynatrace Global CISO report 2023), CISOs were asked to identify factors that made it more difficult to pinpoint and resolve application vulnerabilities.  </a:t>
+              <a:t>were asked to identify factors that made it more difficult to pinpoint and resolve application vulnerabilities.  </a:t>
             </a:r>
           </a:p>
           <a:p>
@@ -3825,8 +4645,85 @@
                 <a:effectLst/>
                 <a:latin typeface="Fira Sans" panose="020B0503050000020004" pitchFamily="34" charset="0"/>
               </a:rPr>
-              <a:t> part code caused issues.  If we think about Log4J a number of organisations believed they where not exposed until they started to think about the dependencies not just of their only code, but the dependencies of the packages they use, and the exposure their vendors had.</a:t>
-            </a:r>
+              <a:t> part code caused issues. </a:t>
+            </a:r>
+            <a:endParaRPr lang="en-GB" b="0" i="0" dirty="0" smtClean="0">
+              <a:solidFill>
+                <a:srgbClr val="242626"/>
+              </a:solidFill>
+              <a:effectLst/>
+              <a:latin typeface="Fira Sans" panose="020B0503050000020004" pitchFamily="34" charset="0"/>
+            </a:endParaRPr>
+          </a:p>
+          <a:p>
+            <a:r>
+              <a:rPr lang="en-GB" b="0" i="0" dirty="0" smtClean="0">
+                <a:solidFill>
+                  <a:srgbClr val="242626"/>
+                </a:solidFill>
+                <a:effectLst/>
+                <a:latin typeface="Fira Sans" panose="020B0503050000020004" pitchFamily="34" charset="0"/>
+              </a:rPr>
+              <a:t>Log4J </a:t>
+            </a:r>
+          </a:p>
+          <a:p>
+            <a:r>
+              <a:rPr lang="en-GB" b="0" i="0" dirty="0" smtClean="0">
+                <a:solidFill>
+                  <a:srgbClr val="242626"/>
+                </a:solidFill>
+                <a:effectLst/>
+                <a:latin typeface="Fira Sans" panose="020B0503050000020004" pitchFamily="34" charset="0"/>
+              </a:rPr>
+              <a:t>not </a:t>
+            </a:r>
+            <a:r>
+              <a:rPr lang="en-GB" b="0" i="0" dirty="0">
+                <a:solidFill>
+                  <a:srgbClr val="242626"/>
+                </a:solidFill>
+                <a:effectLst/>
+                <a:latin typeface="Fira Sans" panose="020B0503050000020004" pitchFamily="34" charset="0"/>
+              </a:rPr>
+              <a:t>exposed </a:t>
+            </a:r>
+            <a:endParaRPr lang="en-GB" b="0" i="0" dirty="0" smtClean="0">
+              <a:solidFill>
+                <a:srgbClr val="242626"/>
+              </a:solidFill>
+              <a:effectLst/>
+              <a:latin typeface="Fira Sans" panose="020B0503050000020004" pitchFamily="34" charset="0"/>
+            </a:endParaRPr>
+          </a:p>
+          <a:p>
+            <a:r>
+              <a:rPr lang="en-GB" b="0" i="0" dirty="0" smtClean="0">
+                <a:solidFill>
+                  <a:srgbClr val="242626"/>
+                </a:solidFill>
+                <a:effectLst/>
+                <a:latin typeface="Fira Sans" panose="020B0503050000020004" pitchFamily="34" charset="0"/>
+              </a:rPr>
+              <a:t>think </a:t>
+            </a:r>
+            <a:r>
+              <a:rPr lang="en-GB" b="0" i="0" dirty="0">
+                <a:solidFill>
+                  <a:srgbClr val="242626"/>
+                </a:solidFill>
+                <a:effectLst/>
+                <a:latin typeface="Fira Sans" panose="020B0503050000020004" pitchFamily="34" charset="0"/>
+              </a:rPr>
+              <a:t>about the dependencies </a:t>
+            </a:r>
+            <a:endParaRPr lang="en-GB" b="0" i="0" dirty="0" smtClean="0">
+              <a:solidFill>
+                <a:srgbClr val="242626"/>
+              </a:solidFill>
+              <a:effectLst/>
+              <a:latin typeface="Fira Sans" panose="020B0503050000020004" pitchFamily="34" charset="0"/>
+            </a:endParaRPr>
           </a:p>
           <a:p>
             <a:endParaRPr lang="en-GB" b="0" i="0" dirty="0">
@@ -4034,8 +4931,119 @@
               <a:defRPr/>
             </a:pPr>
             <a:r>
+              <a:rPr lang="en-GB" baseline="0" dirty="0" smtClean="0"/>
+              <a:t>CI/CD / simplest pipelines</a:t>
+            </a:r>
+          </a:p>
+          <a:p>
+            <a:pPr marL="0" marR="0" lvl="0" indent="0" algn="l" defTabSz="914400" rtl="0" eaLnBrk="1" fontAlgn="auto" latinLnBrk="0" hangingPunct="1">
+              <a:lnSpc>
+                <a:spcPct val="100000"/>
+              </a:lnSpc>
+              <a:spcBef>
+                <a:spcPts val="0"/>
+              </a:spcBef>
+              <a:spcAft>
+                <a:spcPts val="0"/>
+              </a:spcAft>
+              <a:buClrTx/>
+              <a:buSzTx/>
+              <a:buFontTx/>
+              <a:buNone/>
+              <a:tabLst/>
+              <a:defRPr/>
+            </a:pPr>
+            <a:r>
+              <a:rPr lang="en-GB" baseline="0" dirty="0" smtClean="0"/>
+              <a:t>Start </a:t>
+            </a:r>
+            <a:r>
               <a:rPr lang="en-GB" baseline="0" dirty="0"/>
-              <a:t>The most basic answer is CI/CD.  Even the simplest pipelines can start you on the road to repeatable, reliable, and secure deployments.  If you have to start with a documented set of manual steps, it is better than ad hoc “copy and pray” deployments.  These steps can then be replaced over time with automated processes.  Our goal is to automate everything, but that isn’t always possible.  Code scans, syntax checking, dependency checks, and secret scans can all be introduced into pipelines to reduce the number of vulnerabilities and errors.  We can trust that our developers won’t make mistakes, but there is no harm in verifying.</a:t>
+              <a:t>with a documented set of manual steps, it is better than ad hoc “copy and pray” deployments.  </a:t>
+            </a:r>
+            <a:endParaRPr lang="en-GB" baseline="0" dirty="0" smtClean="0"/>
+          </a:p>
+          <a:p>
+            <a:pPr marL="0" marR="0" lvl="0" indent="0" algn="l" defTabSz="914400" rtl="0" eaLnBrk="1" fontAlgn="auto" latinLnBrk="0" hangingPunct="1">
+              <a:lnSpc>
+                <a:spcPct val="100000"/>
+              </a:lnSpc>
+              <a:spcBef>
+                <a:spcPts val="0"/>
+              </a:spcBef>
+              <a:spcAft>
+                <a:spcPts val="0"/>
+              </a:spcAft>
+              <a:buClrTx/>
+              <a:buSzTx/>
+              <a:buFontTx/>
+              <a:buNone/>
+              <a:tabLst/>
+              <a:defRPr/>
+            </a:pPr>
+            <a:r>
+              <a:rPr lang="en-GB" baseline="0" dirty="0" smtClean="0"/>
+              <a:t>Replace </a:t>
+            </a:r>
+            <a:r>
+              <a:rPr lang="en-GB" baseline="0" dirty="0"/>
+              <a:t>over time with automated processes.  </a:t>
+            </a:r>
+            <a:endParaRPr lang="en-GB" baseline="0" dirty="0" smtClean="0"/>
+          </a:p>
+          <a:p>
+            <a:pPr marL="0" marR="0" lvl="0" indent="0" algn="l" defTabSz="914400" rtl="0" eaLnBrk="1" fontAlgn="auto" latinLnBrk="0" hangingPunct="1">
+              <a:lnSpc>
+                <a:spcPct val="100000"/>
+              </a:lnSpc>
+              <a:spcBef>
+                <a:spcPts val="0"/>
+              </a:spcBef>
+              <a:spcAft>
+                <a:spcPts val="0"/>
+              </a:spcAft>
+              <a:buClrTx/>
+              <a:buSzTx/>
+              <a:buFontTx/>
+              <a:buNone/>
+              <a:tabLst/>
+              <a:defRPr/>
+            </a:pPr>
+            <a:r>
+              <a:rPr lang="en-GB" baseline="0" dirty="0" smtClean="0"/>
+              <a:t>Automate </a:t>
+            </a:r>
+            <a:r>
+              <a:rPr lang="en-GB" baseline="0" dirty="0"/>
+              <a:t>everything, but that isn’t always possible.  </a:t>
+            </a:r>
+            <a:endParaRPr lang="en-GB" baseline="0" dirty="0" smtClean="0"/>
+          </a:p>
+          <a:p>
+            <a:pPr marL="0" marR="0" lvl="0" indent="0" algn="l" defTabSz="914400" rtl="0" eaLnBrk="1" fontAlgn="auto" latinLnBrk="0" hangingPunct="1">
+              <a:lnSpc>
+                <a:spcPct val="100000"/>
+              </a:lnSpc>
+              <a:spcBef>
+                <a:spcPts val="0"/>
+              </a:spcBef>
+              <a:spcAft>
+                <a:spcPts val="0"/>
+              </a:spcAft>
+              <a:buClrTx/>
+              <a:buSzTx/>
+              <a:buFontTx/>
+              <a:buNone/>
+              <a:tabLst/>
+              <a:defRPr/>
+            </a:pPr>
+            <a:r>
+              <a:rPr lang="en-GB" baseline="0" dirty="0" smtClean="0"/>
+              <a:t>Code </a:t>
+            </a:r>
+            <a:r>
+              <a:rPr lang="en-GB" baseline="0" dirty="0"/>
+              <a:t>scans, syntax checking, dependency checks, and secret scans can all be introduced into pipelines to reduce the number of vulnerabilities and errors.  We can trust that our developers won’t make mistakes, but there is no harm in verifying.</a:t>
             </a:r>
           </a:p>
           <a:p>
@@ -36969,6 +37977,14 @@
   <p:clrMapOvr>
     <a:masterClrMapping/>
   </p:clrMapOvr>
+  <mc:AlternateContent xmlns:mc="http://schemas.openxmlformats.org/markup-compatibility/2006">
+    <mc:Choice xmlns:p14="http://schemas.microsoft.com/office/powerpoint/2010/main" Requires="p14">
+      <p:transition spd="slow" p14:dur="2000"/>
+    </mc:Choice>
+    <mc:Fallback>
+      <p:transition spd="slow"/>
+    </mc:Fallback>
+  </mc:AlternateContent>
 </p:sld>
 </file>
 
@@ -37593,6 +38609,14 @@
   <p:clrMapOvr>
     <a:masterClrMapping/>
   </p:clrMapOvr>
+  <mc:AlternateContent xmlns:mc="http://schemas.openxmlformats.org/markup-compatibility/2006">
+    <mc:Choice xmlns:p14="http://schemas.microsoft.com/office/powerpoint/2010/main" Requires="p14">
+      <p:transition spd="slow" p14:dur="2000"/>
+    </mc:Choice>
+    <mc:Fallback>
+      <p:transition spd="slow"/>
+    </mc:Fallback>
+  </mc:AlternateContent>
 </p:sld>
 </file>
 
@@ -40032,8 +41056,8 @@
         </p:blipFill>
         <p:spPr bwMode="auto">
           <a:xfrm>
-            <a:off x="1011688" y="3654414"/>
-            <a:ext cx="3695700" cy="1238250"/>
+            <a:off x="1499960" y="3130631"/>
+            <a:ext cx="2454334" cy="822328"/>
           </a:xfrm>
           <a:prstGeom prst="rect">
             <a:avLst/>
@@ -40402,6 +41426,30 @@
           </p:txBody>
         </p:sp>
       </p:grpSp>
+      <p:pic>
+        <p:nvPicPr>
+          <p:cNvPr id="13" name="Picture 12"/>
+          <p:cNvPicPr>
+            <a:picLocks noChangeAspect="1"/>
+          </p:cNvPicPr>
+          <p:nvPr/>
+        </p:nvPicPr>
+        <p:blipFill>
+          <a:blip r:embed="rId9"/>
+          <a:stretch>
+            <a:fillRect/>
+          </a:stretch>
+        </p:blipFill>
+        <p:spPr>
+          <a:xfrm>
+            <a:off x="2000014" y="4453964"/>
+            <a:ext cx="1454225" cy="1447874"/>
+          </a:xfrm>
+          <a:prstGeom prst="rect">
+            <a:avLst/>
+          </a:prstGeom>
+        </p:spPr>
+      </p:pic>
     </p:spTree>
     <p:extLst>
       <p:ext uri="{BB962C8B-B14F-4D97-AF65-F5344CB8AC3E}">

</xml_diff>